<commit_message>
added finished rsa presentation
</commit_message>
<xml_diff>
--- a/rsa/pres/rsa_presentation.pptx
+++ b/rsa/pres/rsa_presentation.pptx
@@ -16,6 +16,9 @@
     <p:sldId id="265" r:id="rId10"/>
     <p:sldId id="264" r:id="rId11"/>
     <p:sldId id="266" r:id="rId12"/>
+    <p:sldId id="267" r:id="rId13"/>
+    <p:sldId id="268" r:id="rId14"/>
+    <p:sldId id="269" r:id="rId15"/>
   </p:sldIdLst>
   <p:sldSz cx="12192000" cy="6858000"/>
   <p:notesSz cx="6858000" cy="9144000"/>
@@ -3614,7 +3617,7 @@
           <a:p>
             <a:fld id="{FB549AF3-BBB7-41FD-8D85-10FB49CA5CBA}" type="datetimeFigureOut">
               <a:rPr lang="en-US" smtClean="0"/>
-              <a:t>4/7/2021</a:t>
+              <a:t>4/11/2021</a:t>
             </a:fld>
             <a:endParaRPr lang="en-US"/>
           </a:p>
@@ -3948,7 +3951,7 @@
           <a:p>
             <a:fld id="{FB549AF3-BBB7-41FD-8D85-10FB49CA5CBA}" type="datetimeFigureOut">
               <a:rPr lang="en-US" smtClean="0"/>
-              <a:t>4/7/2021</a:t>
+              <a:t>4/11/2021</a:t>
             </a:fld>
             <a:endParaRPr lang="en-US"/>
           </a:p>
@@ -4226,7 +4229,7 @@
           <a:p>
             <a:fld id="{FB549AF3-BBB7-41FD-8D85-10FB49CA5CBA}" type="datetimeFigureOut">
               <a:rPr lang="en-US" smtClean="0"/>
-              <a:t>4/7/2021</a:t>
+              <a:t>4/11/2021</a:t>
             </a:fld>
             <a:endParaRPr lang="en-US"/>
           </a:p>
@@ -4794,7 +4797,7 @@
           <a:p>
             <a:fld id="{FB549AF3-BBB7-41FD-8D85-10FB49CA5CBA}" type="datetimeFigureOut">
               <a:rPr lang="en-US" smtClean="0"/>
-              <a:t>4/7/2021</a:t>
+              <a:t>4/11/2021</a:t>
             </a:fld>
             <a:endParaRPr lang="en-US"/>
           </a:p>
@@ -5072,7 +5075,7 @@
           <a:p>
             <a:fld id="{FB549AF3-BBB7-41FD-8D85-10FB49CA5CBA}" type="datetimeFigureOut">
               <a:rPr lang="en-US" smtClean="0"/>
-              <a:t>4/7/2021</a:t>
+              <a:t>4/11/2021</a:t>
             </a:fld>
             <a:endParaRPr lang="en-US"/>
           </a:p>
@@ -5634,7 +5637,7 @@
           <a:p>
             <a:fld id="{FB549AF3-BBB7-41FD-8D85-10FB49CA5CBA}" type="datetimeFigureOut">
               <a:rPr lang="en-US" smtClean="0"/>
-              <a:t>4/7/2021</a:t>
+              <a:t>4/11/2021</a:t>
             </a:fld>
             <a:endParaRPr lang="en-US"/>
           </a:p>
@@ -5961,7 +5964,7 @@
           <a:p>
             <a:fld id="{FB549AF3-BBB7-41FD-8D85-10FB49CA5CBA}" type="datetimeFigureOut">
               <a:rPr lang="en-US" smtClean="0"/>
-              <a:t>4/7/2021</a:t>
+              <a:t>4/11/2021</a:t>
             </a:fld>
             <a:endParaRPr lang="en-US"/>
           </a:p>
@@ -6138,7 +6141,7 @@
           <a:p>
             <a:fld id="{FB549AF3-BBB7-41FD-8D85-10FB49CA5CBA}" type="datetimeFigureOut">
               <a:rPr lang="en-US" smtClean="0"/>
-              <a:t>4/7/2021</a:t>
+              <a:t>4/11/2021</a:t>
             </a:fld>
             <a:endParaRPr lang="en-US"/>
           </a:p>
@@ -6376,7 +6379,7 @@
           <a:p>
             <a:fld id="{FB549AF3-BBB7-41FD-8D85-10FB49CA5CBA}" type="datetimeFigureOut">
               <a:rPr lang="en-US" smtClean="0"/>
-              <a:t>4/7/2021</a:t>
+              <a:t>4/11/2021</a:t>
             </a:fld>
             <a:endParaRPr lang="en-US"/>
           </a:p>
@@ -6576,7 +6579,7 @@
           <a:p>
             <a:fld id="{FB549AF3-BBB7-41FD-8D85-10FB49CA5CBA}" type="datetimeFigureOut">
               <a:rPr lang="en-US" smtClean="0"/>
-              <a:t>4/7/2021</a:t>
+              <a:t>4/11/2021</a:t>
             </a:fld>
             <a:endParaRPr lang="en-US"/>
           </a:p>
@@ -6852,7 +6855,7 @@
           <a:p>
             <a:fld id="{FB549AF3-BBB7-41FD-8D85-10FB49CA5CBA}" type="datetimeFigureOut">
               <a:rPr lang="en-US" smtClean="0"/>
-              <a:t>4/7/2021</a:t>
+              <a:t>4/11/2021</a:t>
             </a:fld>
             <a:endParaRPr lang="en-US"/>
           </a:p>
@@ -7118,7 +7121,7 @@
           <a:p>
             <a:fld id="{FB549AF3-BBB7-41FD-8D85-10FB49CA5CBA}" type="datetimeFigureOut">
               <a:rPr lang="en-US" smtClean="0"/>
-              <a:t>4/7/2021</a:t>
+              <a:t>4/11/2021</a:t>
             </a:fld>
             <a:endParaRPr lang="en-US"/>
           </a:p>
@@ -7492,7 +7495,7 @@
           <a:p>
             <a:fld id="{FB549AF3-BBB7-41FD-8D85-10FB49CA5CBA}" type="datetimeFigureOut">
               <a:rPr lang="en-US" smtClean="0"/>
-              <a:t>4/7/2021</a:t>
+              <a:t>4/11/2021</a:t>
             </a:fld>
             <a:endParaRPr lang="en-US"/>
           </a:p>
@@ -7640,7 +7643,7 @@
           <a:p>
             <a:fld id="{FB549AF3-BBB7-41FD-8D85-10FB49CA5CBA}" type="datetimeFigureOut">
               <a:rPr lang="en-US" smtClean="0"/>
-              <a:t>4/7/2021</a:t>
+              <a:t>4/11/2021</a:t>
             </a:fld>
             <a:endParaRPr lang="en-US"/>
           </a:p>
@@ -7765,7 +7768,7 @@
           <a:p>
             <a:fld id="{FB549AF3-BBB7-41FD-8D85-10FB49CA5CBA}" type="datetimeFigureOut">
               <a:rPr lang="en-US" smtClean="0"/>
-              <a:t>4/7/2021</a:t>
+              <a:t>4/11/2021</a:t>
             </a:fld>
             <a:endParaRPr lang="en-US"/>
           </a:p>
@@ -8050,7 +8053,7 @@
           <a:p>
             <a:fld id="{FB549AF3-BBB7-41FD-8D85-10FB49CA5CBA}" type="datetimeFigureOut">
               <a:rPr lang="en-US" smtClean="0"/>
-              <a:t>4/7/2021</a:t>
+              <a:t>4/11/2021</a:t>
             </a:fld>
             <a:endParaRPr lang="en-US"/>
           </a:p>
@@ -8374,7 +8377,7 @@
           <a:p>
             <a:fld id="{FB549AF3-BBB7-41FD-8D85-10FB49CA5CBA}" type="datetimeFigureOut">
               <a:rPr lang="en-US" smtClean="0"/>
-              <a:t>4/7/2021</a:t>
+              <a:t>4/11/2021</a:t>
             </a:fld>
             <a:endParaRPr lang="en-US"/>
           </a:p>
@@ -8588,7 +8591,7 @@
           <a:p>
             <a:fld id="{FB549AF3-BBB7-41FD-8D85-10FB49CA5CBA}" type="datetimeFigureOut">
               <a:rPr lang="en-US" smtClean="0"/>
-              <a:t>4/7/2021</a:t>
+              <a:t>4/11/2021</a:t>
             </a:fld>
             <a:endParaRPr lang="en-US"/>
           </a:p>
@@ -9443,6 +9446,15 @@
 <file path=ppt/slides/slide11.xml><?xml version="1.0" encoding="utf-8"?>
 <p:sld xmlns:a="http://schemas.openxmlformats.org/drawingml/2006/main" xmlns:r="http://schemas.openxmlformats.org/officeDocument/2006/relationships" xmlns:p="http://schemas.openxmlformats.org/presentationml/2006/main">
   <p:cSld>
+    <p:bg>
+      <p:bgPr>
+        <a:blipFill>
+          <a:blip r:embed="rId2"/>
+          <a:stretch/>
+        </a:blipFill>
+        <a:effectLst/>
+      </p:bgPr>
+    </p:bg>
     <p:spTree>
       <p:nvGrpSpPr>
         <p:cNvPr id="1" name=""/>
@@ -9473,9 +9485,16 @@
             <p:ph type="title"/>
           </p:nvPr>
         </p:nvSpPr>
-        <p:spPr/>
-        <p:txBody>
-          <a:bodyPr/>
+        <p:spPr>
+          <a:xfrm>
+            <a:off x="825909" y="808055"/>
+            <a:ext cx="3979205" cy="1453363"/>
+          </a:xfrm>
+        </p:spPr>
+        <p:txBody>
+          <a:bodyPr>
+            <a:normAutofit/>
+          </a:bodyPr>
           <a:lstStyle/>
           <a:p>
             <a:r>
@@ -9487,10 +9506,10 @@
       </p:sp>
       <p:sp>
         <p:nvSpPr>
-          <p:cNvPr id="3" name="Content Placeholder 2">
+          <p:cNvPr id="5" name="Content Placeholder 4">
             <a:extLst>
               <a:ext uri="{FF2B5EF4-FFF2-40B4-BE49-F238E27FC236}">
-                <a16:creationId xmlns:a16="http://schemas.microsoft.com/office/drawing/2014/main" id="{D01A7A72-78E6-4BCF-90A0-FFD0E529B33D}"/>
+                <a16:creationId xmlns:a16="http://schemas.microsoft.com/office/drawing/2014/main" id="{070B7EB0-4233-4031-865A-5E4758A999E4}"/>
               </a:ext>
             </a:extLst>
           </p:cNvPr>
@@ -9501,22 +9520,688 @@
             <p:ph idx="1"/>
           </p:nvPr>
         </p:nvSpPr>
-        <p:spPr/>
-        <p:txBody>
-          <a:bodyPr/>
+        <p:spPr>
+          <a:xfrm>
+            <a:off x="802178" y="2261420"/>
+            <a:ext cx="4002936" cy="3637935"/>
+          </a:xfrm>
+        </p:spPr>
+        <p:txBody>
+          <a:bodyPr>
+            <a:normAutofit/>
+          </a:bodyPr>
           <a:lstStyle/>
           <a:p>
             <a:r>
               <a:rPr lang="en-US" dirty="0"/>
-              <a:t>Fill out with screenshots of program running</a:t>
-            </a:r>
-          </a:p>
-        </p:txBody>
-      </p:sp>
+              <a:t>1. Pick two primes as inputs to the key generation</a:t>
+            </a:r>
+          </a:p>
+          <a:p>
+            <a:r>
+              <a:rPr lang="en-US" dirty="0"/>
+              <a:t>2. Key generation verifies, then performs the RSA keygen algorithm to find a P, S, and N such that</a:t>
+            </a:r>
+          </a:p>
+          <a:p>
+            <a:pPr lvl="1"/>
+            <a:r>
+              <a:rPr lang="en-US" dirty="0"/>
+              <a:t>FP(</a:t>
+            </a:r>
+            <a:r>
+              <a:rPr lang="en-US" dirty="0" err="1"/>
+              <a:t>x,n</a:t>
+            </a:r>
+            <a:r>
+              <a:rPr lang="en-US" dirty="0"/>
+              <a:t>) = </a:t>
+            </a:r>
+            <a:r>
+              <a:rPr lang="en-US" dirty="0" err="1"/>
+              <a:t>x^P</a:t>
+            </a:r>
+            <a:r>
+              <a:rPr lang="en-US" dirty="0"/>
+              <a:t> % n</a:t>
+            </a:r>
+          </a:p>
+          <a:p>
+            <a:pPr lvl="1"/>
+            <a:r>
+              <a:rPr lang="en-US" dirty="0"/>
+              <a:t>FS(</a:t>
+            </a:r>
+            <a:r>
+              <a:rPr lang="en-US" dirty="0" err="1"/>
+              <a:t>x,n</a:t>
+            </a:r>
+            <a:r>
+              <a:rPr lang="en-US" dirty="0"/>
+              <a:t>) = </a:t>
+            </a:r>
+            <a:r>
+              <a:rPr lang="en-US" dirty="0" err="1"/>
+              <a:t>x^S</a:t>
+            </a:r>
+            <a:r>
+              <a:rPr lang="en-US" dirty="0"/>
+              <a:t> % n</a:t>
+            </a:r>
+          </a:p>
+          <a:p>
+            <a:pPr lvl="1"/>
+            <a:r>
+              <a:rPr lang="en-US" dirty="0"/>
+              <a:t>FP( FS(</a:t>
+            </a:r>
+            <a:r>
+              <a:rPr lang="en-US" dirty="0" err="1"/>
+              <a:t>x,n</a:t>
+            </a:r>
+            <a:r>
+              <a:rPr lang="en-US" dirty="0"/>
+              <a:t>), n) = x</a:t>
+            </a:r>
+          </a:p>
+        </p:txBody>
+      </p:sp>
+      <p:pic>
+        <p:nvPicPr>
+          <p:cNvPr id="7" name="Picture 6">
+            <a:extLst>
+              <a:ext uri="{FF2B5EF4-FFF2-40B4-BE49-F238E27FC236}">
+                <a16:creationId xmlns:a16="http://schemas.microsoft.com/office/drawing/2014/main" id="{BFCB82AE-39FE-426D-97E9-C671C9D768B2}"/>
+              </a:ext>
+            </a:extLst>
+          </p:cNvPr>
+          <p:cNvPicPr>
+            <a:picLocks noChangeAspect="1"/>
+          </p:cNvPicPr>
+          <p:nvPr/>
+        </p:nvPicPr>
+        <p:blipFill>
+          <a:blip r:embed="rId3"/>
+          <a:stretch>
+            <a:fillRect/>
+          </a:stretch>
+        </p:blipFill>
+        <p:spPr>
+          <a:xfrm>
+            <a:off x="5564210" y="796413"/>
+            <a:ext cx="5546677" cy="5102943"/>
+          </a:xfrm>
+          <a:prstGeom prst="roundRect">
+            <a:avLst>
+              <a:gd name="adj" fmla="val 4380"/>
+            </a:avLst>
+          </a:prstGeom>
+          <a:ln w="50800" cap="sq" cmpd="dbl">
+            <a:gradFill flip="none" rotWithShape="1">
+              <a:gsLst>
+                <a:gs pos="0">
+                  <a:srgbClr val="FFFFFF"/>
+                </a:gs>
+                <a:gs pos="100000">
+                  <a:schemeClr val="tx1">
+                    <a:alpha val="0"/>
+                  </a:schemeClr>
+                </a:gs>
+              </a:gsLst>
+              <a:path path="circle">
+                <a:fillToRect l="50000" t="50000" r="50000" b="50000"/>
+              </a:path>
+              <a:tileRect/>
+            </a:gradFill>
+            <a:miter lim="800000"/>
+          </a:ln>
+          <a:effectLst>
+            <a:outerShdw blurRad="254000" algn="tl" rotWithShape="0">
+              <a:srgbClr val="000000">
+                <a:alpha val="43000"/>
+              </a:srgbClr>
+            </a:outerShdw>
+          </a:effectLst>
+        </p:spPr>
+      </p:pic>
     </p:spTree>
     <p:extLst>
       <p:ext uri="{BB962C8B-B14F-4D97-AF65-F5344CB8AC3E}">
         <p14:creationId xmlns:p14="http://schemas.microsoft.com/office/powerpoint/2010/main" val="3095251866"/>
+      </p:ext>
+    </p:extLst>
+  </p:cSld>
+  <p:clrMapOvr>
+    <a:masterClrMapping/>
+  </p:clrMapOvr>
+</p:sld>
+</file>
+
+<file path=ppt/slides/slide12.xml><?xml version="1.0" encoding="utf-8"?>
+<p:sld xmlns:a="http://schemas.openxmlformats.org/drawingml/2006/main" xmlns:r="http://schemas.openxmlformats.org/officeDocument/2006/relationships" xmlns:p="http://schemas.openxmlformats.org/presentationml/2006/main">
+  <p:cSld>
+    <p:bg>
+      <p:bgPr>
+        <a:blipFill>
+          <a:blip r:embed="rId2"/>
+          <a:stretch/>
+        </a:blipFill>
+        <a:effectLst/>
+      </p:bgPr>
+    </p:bg>
+    <p:spTree>
+      <p:nvGrpSpPr>
+        <p:cNvPr id="1" name=""/>
+        <p:cNvGrpSpPr/>
+        <p:nvPr/>
+      </p:nvGrpSpPr>
+      <p:grpSpPr>
+        <a:xfrm>
+          <a:off x="0" y="0"/>
+          <a:ext cx="0" cy="0"/>
+          <a:chOff x="0" y="0"/>
+          <a:chExt cx="0" cy="0"/>
+        </a:xfrm>
+      </p:grpSpPr>
+      <p:sp>
+        <p:nvSpPr>
+          <p:cNvPr id="2" name="Title 1">
+            <a:extLst>
+              <a:ext uri="{FF2B5EF4-FFF2-40B4-BE49-F238E27FC236}">
+                <a16:creationId xmlns:a16="http://schemas.microsoft.com/office/drawing/2014/main" id="{8CBCFF0F-1827-4DC0-ABAA-51FD4CF0B934}"/>
+              </a:ext>
+            </a:extLst>
+          </p:cNvPr>
+          <p:cNvSpPr>
+            <a:spLocks noGrp="1"/>
+          </p:cNvSpPr>
+          <p:nvPr>
+            <p:ph type="title"/>
+          </p:nvPr>
+        </p:nvSpPr>
+        <p:spPr>
+          <a:xfrm>
+            <a:off x="825909" y="808055"/>
+            <a:ext cx="3979205" cy="1453363"/>
+          </a:xfrm>
+        </p:spPr>
+        <p:txBody>
+          <a:bodyPr>
+            <a:normAutofit/>
+          </a:bodyPr>
+          <a:lstStyle/>
+          <a:p>
+            <a:r>
+              <a:rPr lang="en-US" dirty="0"/>
+              <a:t>Example (Cont’d)</a:t>
+            </a:r>
+          </a:p>
+        </p:txBody>
+      </p:sp>
+      <p:sp>
+        <p:nvSpPr>
+          <p:cNvPr id="3" name="Content Placeholder 2">
+            <a:extLst>
+              <a:ext uri="{FF2B5EF4-FFF2-40B4-BE49-F238E27FC236}">
+                <a16:creationId xmlns:a16="http://schemas.microsoft.com/office/drawing/2014/main" id="{6B990164-3C67-4C99-8C76-F5D0C493DE13}"/>
+              </a:ext>
+            </a:extLst>
+          </p:cNvPr>
+          <p:cNvSpPr>
+            <a:spLocks noGrp="1"/>
+          </p:cNvSpPr>
+          <p:nvPr>
+            <p:ph idx="1"/>
+          </p:nvPr>
+        </p:nvSpPr>
+        <p:spPr>
+          <a:xfrm>
+            <a:off x="802178" y="2261420"/>
+            <a:ext cx="4002936" cy="3637935"/>
+          </a:xfrm>
+        </p:spPr>
+        <p:txBody>
+          <a:bodyPr>
+            <a:normAutofit/>
+          </a:bodyPr>
+          <a:lstStyle/>
+          <a:p>
+            <a:r>
+              <a:rPr lang="en-US" dirty="0"/>
+              <a:t>By opening the key files, we can see the current values of the public and secret keys</a:t>
+            </a:r>
+          </a:p>
+          <a:p>
+            <a:r>
+              <a:rPr lang="en-US" dirty="0"/>
+              <a:t>Both the public key and the secret key save the same value of n</a:t>
+            </a:r>
+          </a:p>
+        </p:txBody>
+      </p:sp>
+      <p:pic>
+        <p:nvPicPr>
+          <p:cNvPr id="5" name="Picture 4">
+            <a:extLst>
+              <a:ext uri="{FF2B5EF4-FFF2-40B4-BE49-F238E27FC236}">
+                <a16:creationId xmlns:a16="http://schemas.microsoft.com/office/drawing/2014/main" id="{D5A147CA-2CB7-42B5-9CF8-6825606BA9EB}"/>
+              </a:ext>
+            </a:extLst>
+          </p:cNvPr>
+          <p:cNvPicPr>
+            <a:picLocks noChangeAspect="1"/>
+          </p:cNvPicPr>
+          <p:nvPr/>
+        </p:nvPicPr>
+        <p:blipFill>
+          <a:blip r:embed="rId3"/>
+          <a:stretch>
+            <a:fillRect/>
+          </a:stretch>
+        </p:blipFill>
+        <p:spPr>
+          <a:xfrm>
+            <a:off x="5289752" y="1191569"/>
+            <a:ext cx="6095593" cy="4312631"/>
+          </a:xfrm>
+          <a:prstGeom prst="roundRect">
+            <a:avLst>
+              <a:gd name="adj" fmla="val 4380"/>
+            </a:avLst>
+          </a:prstGeom>
+          <a:ln w="50800" cap="sq" cmpd="dbl">
+            <a:gradFill flip="none" rotWithShape="1">
+              <a:gsLst>
+                <a:gs pos="0">
+                  <a:srgbClr val="FFFFFF"/>
+                </a:gs>
+                <a:gs pos="100000">
+                  <a:schemeClr val="tx1">
+                    <a:alpha val="0"/>
+                  </a:schemeClr>
+                </a:gs>
+              </a:gsLst>
+              <a:path path="circle">
+                <a:fillToRect l="50000" t="50000" r="50000" b="50000"/>
+              </a:path>
+              <a:tileRect/>
+            </a:gradFill>
+            <a:miter lim="800000"/>
+          </a:ln>
+          <a:effectLst>
+            <a:outerShdw blurRad="254000" algn="tl" rotWithShape="0">
+              <a:srgbClr val="000000">
+                <a:alpha val="43000"/>
+              </a:srgbClr>
+            </a:outerShdw>
+          </a:effectLst>
+        </p:spPr>
+      </p:pic>
+    </p:spTree>
+    <p:extLst>
+      <p:ext uri="{BB962C8B-B14F-4D97-AF65-F5344CB8AC3E}">
+        <p14:creationId xmlns:p14="http://schemas.microsoft.com/office/powerpoint/2010/main" val="1233516154"/>
+      </p:ext>
+    </p:extLst>
+  </p:cSld>
+  <p:clrMapOvr>
+    <a:masterClrMapping/>
+  </p:clrMapOvr>
+</p:sld>
+</file>
+
+<file path=ppt/slides/slide13.xml><?xml version="1.0" encoding="utf-8"?>
+<p:sld xmlns:a="http://schemas.openxmlformats.org/drawingml/2006/main" xmlns:r="http://schemas.openxmlformats.org/officeDocument/2006/relationships" xmlns:p="http://schemas.openxmlformats.org/presentationml/2006/main">
+  <p:cSld>
+    <p:bg>
+      <p:bgPr>
+        <a:blipFill>
+          <a:blip r:embed="rId2"/>
+          <a:stretch/>
+        </a:blipFill>
+        <a:effectLst/>
+      </p:bgPr>
+    </p:bg>
+    <p:spTree>
+      <p:nvGrpSpPr>
+        <p:cNvPr id="1" name=""/>
+        <p:cNvGrpSpPr/>
+        <p:nvPr/>
+      </p:nvGrpSpPr>
+      <p:grpSpPr>
+        <a:xfrm>
+          <a:off x="0" y="0"/>
+          <a:ext cx="0" cy="0"/>
+          <a:chOff x="0" y="0"/>
+          <a:chExt cx="0" cy="0"/>
+        </a:xfrm>
+      </p:grpSpPr>
+      <p:sp>
+        <p:nvSpPr>
+          <p:cNvPr id="2" name="Title 1">
+            <a:extLst>
+              <a:ext uri="{FF2B5EF4-FFF2-40B4-BE49-F238E27FC236}">
+                <a16:creationId xmlns:a16="http://schemas.microsoft.com/office/drawing/2014/main" id="{D670A7CD-E729-4FC0-9270-69D0BED5CAE1}"/>
+              </a:ext>
+            </a:extLst>
+          </p:cNvPr>
+          <p:cNvSpPr>
+            <a:spLocks noGrp="1"/>
+          </p:cNvSpPr>
+          <p:nvPr>
+            <p:ph type="title"/>
+          </p:nvPr>
+        </p:nvSpPr>
+        <p:spPr>
+          <a:xfrm>
+            <a:off x="825909" y="808055"/>
+            <a:ext cx="3979205" cy="1453363"/>
+          </a:xfrm>
+        </p:spPr>
+        <p:txBody>
+          <a:bodyPr>
+            <a:normAutofit/>
+          </a:bodyPr>
+          <a:lstStyle/>
+          <a:p>
+            <a:r>
+              <a:rPr lang="en-US"/>
+              <a:t>Example (Cont’d)</a:t>
+            </a:r>
+            <a:endParaRPr lang="en-US" dirty="0"/>
+          </a:p>
+        </p:txBody>
+      </p:sp>
+      <p:sp>
+        <p:nvSpPr>
+          <p:cNvPr id="3" name="Content Placeholder 2">
+            <a:extLst>
+              <a:ext uri="{FF2B5EF4-FFF2-40B4-BE49-F238E27FC236}">
+                <a16:creationId xmlns:a16="http://schemas.microsoft.com/office/drawing/2014/main" id="{52E2BE5B-BAA8-4483-B403-F3F571477050}"/>
+              </a:ext>
+            </a:extLst>
+          </p:cNvPr>
+          <p:cNvSpPr>
+            <a:spLocks noGrp="1"/>
+          </p:cNvSpPr>
+          <p:nvPr>
+            <p:ph idx="1"/>
+          </p:nvPr>
+        </p:nvSpPr>
+        <p:spPr>
+          <a:xfrm>
+            <a:off x="802178" y="2261420"/>
+            <a:ext cx="4002936" cy="3637935"/>
+          </a:xfrm>
+        </p:spPr>
+        <p:txBody>
+          <a:bodyPr>
+            <a:normAutofit/>
+          </a:bodyPr>
+          <a:lstStyle/>
+          <a:p>
+            <a:r>
+              <a:rPr lang="en-US" dirty="0"/>
+              <a:t>The first block shows the contents of the sample file</a:t>
+            </a:r>
+          </a:p>
+          <a:p>
+            <a:r>
+              <a:rPr lang="en-US" dirty="0"/>
+              <a:t>The second shows the encrypted version</a:t>
+            </a:r>
+          </a:p>
+          <a:p>
+            <a:r>
+              <a:rPr lang="en-US" dirty="0"/>
+              <a:t>Results are much larger than the original</a:t>
+            </a:r>
+          </a:p>
+          <a:p>
+            <a:pPr lvl="1"/>
+            <a:r>
+              <a:rPr lang="en-US" dirty="0"/>
+              <a:t>Text must be converted to ASCII (0-255)</a:t>
+            </a:r>
+          </a:p>
+          <a:p>
+            <a:pPr lvl="1"/>
+            <a:r>
+              <a:rPr lang="en-US" dirty="0"/>
+              <a:t>Encrypted ASCII is well outside the range</a:t>
+            </a:r>
+          </a:p>
+        </p:txBody>
+      </p:sp>
+      <p:pic>
+        <p:nvPicPr>
+          <p:cNvPr id="7" name="Picture 6">
+            <a:extLst>
+              <a:ext uri="{FF2B5EF4-FFF2-40B4-BE49-F238E27FC236}">
+                <a16:creationId xmlns:a16="http://schemas.microsoft.com/office/drawing/2014/main" id="{AD572C24-0992-4146-900F-A53BC99A9BA7}"/>
+              </a:ext>
+            </a:extLst>
+          </p:cNvPr>
+          <p:cNvPicPr>
+            <a:picLocks noChangeAspect="1"/>
+          </p:cNvPicPr>
+          <p:nvPr/>
+        </p:nvPicPr>
+        <p:blipFill>
+          <a:blip r:embed="rId3"/>
+          <a:stretch>
+            <a:fillRect/>
+          </a:stretch>
+        </p:blipFill>
+        <p:spPr>
+          <a:xfrm>
+            <a:off x="5289752" y="1991615"/>
+            <a:ext cx="6095593" cy="2712539"/>
+          </a:xfrm>
+          <a:prstGeom prst="roundRect">
+            <a:avLst>
+              <a:gd name="adj" fmla="val 4380"/>
+            </a:avLst>
+          </a:prstGeom>
+          <a:ln w="50800" cap="sq" cmpd="dbl">
+            <a:gradFill flip="none" rotWithShape="1">
+              <a:gsLst>
+                <a:gs pos="0">
+                  <a:srgbClr val="FFFFFF"/>
+                </a:gs>
+                <a:gs pos="100000">
+                  <a:schemeClr val="tx1">
+                    <a:alpha val="0"/>
+                  </a:schemeClr>
+                </a:gs>
+              </a:gsLst>
+              <a:path path="circle">
+                <a:fillToRect l="50000" t="50000" r="50000" b="50000"/>
+              </a:path>
+              <a:tileRect/>
+            </a:gradFill>
+            <a:miter lim="800000"/>
+          </a:ln>
+          <a:effectLst>
+            <a:outerShdw blurRad="254000" algn="tl" rotWithShape="0">
+              <a:srgbClr val="000000">
+                <a:alpha val="43000"/>
+              </a:srgbClr>
+            </a:outerShdw>
+          </a:effectLst>
+        </p:spPr>
+      </p:pic>
+    </p:spTree>
+    <p:extLst>
+      <p:ext uri="{BB962C8B-B14F-4D97-AF65-F5344CB8AC3E}">
+        <p14:creationId xmlns:p14="http://schemas.microsoft.com/office/powerpoint/2010/main" val="4131189724"/>
+      </p:ext>
+    </p:extLst>
+  </p:cSld>
+  <p:clrMapOvr>
+    <a:masterClrMapping/>
+  </p:clrMapOvr>
+</p:sld>
+</file>
+
+<file path=ppt/slides/slide14.xml><?xml version="1.0" encoding="utf-8"?>
+<p:sld xmlns:a="http://schemas.openxmlformats.org/drawingml/2006/main" xmlns:r="http://schemas.openxmlformats.org/officeDocument/2006/relationships" xmlns:p="http://schemas.openxmlformats.org/presentationml/2006/main">
+  <p:cSld>
+    <p:bg>
+      <p:bgPr>
+        <a:blipFill>
+          <a:blip r:embed="rId2"/>
+          <a:stretch/>
+        </a:blipFill>
+        <a:effectLst/>
+      </p:bgPr>
+    </p:bg>
+    <p:spTree>
+      <p:nvGrpSpPr>
+        <p:cNvPr id="1" name=""/>
+        <p:cNvGrpSpPr/>
+        <p:nvPr/>
+      </p:nvGrpSpPr>
+      <p:grpSpPr>
+        <a:xfrm>
+          <a:off x="0" y="0"/>
+          <a:ext cx="0" cy="0"/>
+          <a:chOff x="0" y="0"/>
+          <a:chExt cx="0" cy="0"/>
+        </a:xfrm>
+      </p:grpSpPr>
+      <p:sp>
+        <p:nvSpPr>
+          <p:cNvPr id="2" name="Title 1">
+            <a:extLst>
+              <a:ext uri="{FF2B5EF4-FFF2-40B4-BE49-F238E27FC236}">
+                <a16:creationId xmlns:a16="http://schemas.microsoft.com/office/drawing/2014/main" id="{8AE19F3E-5C2C-4EE3-958E-DF19CACCD0CF}"/>
+              </a:ext>
+            </a:extLst>
+          </p:cNvPr>
+          <p:cNvSpPr>
+            <a:spLocks noGrp="1"/>
+          </p:cNvSpPr>
+          <p:nvPr>
+            <p:ph type="title"/>
+          </p:nvPr>
+        </p:nvSpPr>
+        <p:spPr>
+          <a:xfrm>
+            <a:off x="825909" y="808055"/>
+            <a:ext cx="3979205" cy="1453363"/>
+          </a:xfrm>
+        </p:spPr>
+        <p:txBody>
+          <a:bodyPr>
+            <a:normAutofit/>
+          </a:bodyPr>
+          <a:lstStyle/>
+          <a:p>
+            <a:r>
+              <a:rPr lang="en-US" dirty="0"/>
+              <a:t>Example (Cont’d)</a:t>
+            </a:r>
+          </a:p>
+        </p:txBody>
+      </p:sp>
+      <p:sp>
+        <p:nvSpPr>
+          <p:cNvPr id="3" name="Content Placeholder 2">
+            <a:extLst>
+              <a:ext uri="{FF2B5EF4-FFF2-40B4-BE49-F238E27FC236}">
+                <a16:creationId xmlns:a16="http://schemas.microsoft.com/office/drawing/2014/main" id="{C763CC99-CFE9-4346-9114-FEB730CBC0F3}"/>
+              </a:ext>
+            </a:extLst>
+          </p:cNvPr>
+          <p:cNvSpPr>
+            <a:spLocks noGrp="1"/>
+          </p:cNvSpPr>
+          <p:nvPr>
+            <p:ph idx="1"/>
+          </p:nvPr>
+        </p:nvSpPr>
+        <p:spPr>
+          <a:xfrm>
+            <a:off x="802178" y="2261420"/>
+            <a:ext cx="4002936" cy="3637935"/>
+          </a:xfrm>
+        </p:spPr>
+        <p:txBody>
+          <a:bodyPr>
+            <a:normAutofit/>
+          </a:bodyPr>
+          <a:lstStyle/>
+          <a:p>
+            <a:r>
+              <a:rPr lang="en-US" dirty="0"/>
+              <a:t>Regardless of how garbled the resulting encrypted file is, decrypting yields the original text</a:t>
+            </a:r>
+          </a:p>
+        </p:txBody>
+      </p:sp>
+      <p:pic>
+        <p:nvPicPr>
+          <p:cNvPr id="5" name="Picture 4">
+            <a:extLst>
+              <a:ext uri="{FF2B5EF4-FFF2-40B4-BE49-F238E27FC236}">
+                <a16:creationId xmlns:a16="http://schemas.microsoft.com/office/drawing/2014/main" id="{A6AF3B9D-0D8B-42CF-B29F-434D207E3C93}"/>
+              </a:ext>
+            </a:extLst>
+          </p:cNvPr>
+          <p:cNvPicPr>
+            <a:picLocks noChangeAspect="1"/>
+          </p:cNvPicPr>
+          <p:nvPr/>
+        </p:nvPicPr>
+        <p:blipFill>
+          <a:blip r:embed="rId3"/>
+          <a:stretch>
+            <a:fillRect/>
+          </a:stretch>
+        </p:blipFill>
+        <p:spPr>
+          <a:xfrm>
+            <a:off x="5289752" y="2555458"/>
+            <a:ext cx="6095593" cy="1584853"/>
+          </a:xfrm>
+          <a:prstGeom prst="roundRect">
+            <a:avLst>
+              <a:gd name="adj" fmla="val 4380"/>
+            </a:avLst>
+          </a:prstGeom>
+          <a:ln w="50800" cap="sq" cmpd="dbl">
+            <a:gradFill flip="none" rotWithShape="1">
+              <a:gsLst>
+                <a:gs pos="0">
+                  <a:srgbClr val="FFFFFF"/>
+                </a:gs>
+                <a:gs pos="100000">
+                  <a:schemeClr val="tx1">
+                    <a:alpha val="0"/>
+                  </a:schemeClr>
+                </a:gs>
+              </a:gsLst>
+              <a:path path="circle">
+                <a:fillToRect l="50000" t="50000" r="50000" b="50000"/>
+              </a:path>
+              <a:tileRect/>
+            </a:gradFill>
+            <a:miter lim="800000"/>
+          </a:ln>
+          <a:effectLst>
+            <a:outerShdw blurRad="254000" algn="tl" rotWithShape="0">
+              <a:srgbClr val="000000">
+                <a:alpha val="43000"/>
+              </a:srgbClr>
+            </a:outerShdw>
+          </a:effectLst>
+        </p:spPr>
+      </p:pic>
+    </p:spTree>
+    <p:extLst>
+      <p:ext uri="{BB962C8B-B14F-4D97-AF65-F5344CB8AC3E}">
+        <p14:creationId xmlns:p14="http://schemas.microsoft.com/office/powerpoint/2010/main" val="378303313"/>
       </p:ext>
     </p:extLst>
   </p:cSld>

</xml_diff>